<commit_message>
Updated 02_Lab based on comments.
</commit_message>
<xml_diff>
--- a/server/presentations/02_Lab_Setup.pptx
+++ b/server/presentations/02_Lab_Setup.pptx
@@ -5,10 +5,10 @@
     <p:sldMasterId id="2147483648" r:id="rId1"/>
   </p:sldMasterIdLst>
   <p:notesMasterIdLst>
-    <p:notesMasterId r:id="rId19"/>
+    <p:notesMasterId r:id="rId20"/>
   </p:notesMasterIdLst>
   <p:handoutMasterIdLst>
-    <p:handoutMasterId r:id="rId20"/>
+    <p:handoutMasterId r:id="rId21"/>
   </p:handoutMasterIdLst>
   <p:sldIdLst>
     <p:sldId id="256" r:id="rId2"/>
@@ -17,17 +17,18 @@
     <p:sldId id="294" r:id="rId5"/>
     <p:sldId id="293" r:id="rId6"/>
     <p:sldId id="296" r:id="rId7"/>
-    <p:sldId id="297" r:id="rId8"/>
-    <p:sldId id="298" r:id="rId9"/>
-    <p:sldId id="299" r:id="rId10"/>
-    <p:sldId id="300" r:id="rId11"/>
-    <p:sldId id="301" r:id="rId12"/>
-    <p:sldId id="302" r:id="rId13"/>
-    <p:sldId id="303" r:id="rId14"/>
-    <p:sldId id="304" r:id="rId15"/>
-    <p:sldId id="305" r:id="rId16"/>
-    <p:sldId id="287" r:id="rId17"/>
-    <p:sldId id="286" r:id="rId18"/>
+    <p:sldId id="306" r:id="rId8"/>
+    <p:sldId id="297" r:id="rId9"/>
+    <p:sldId id="298" r:id="rId10"/>
+    <p:sldId id="299" r:id="rId11"/>
+    <p:sldId id="300" r:id="rId12"/>
+    <p:sldId id="301" r:id="rId13"/>
+    <p:sldId id="302" r:id="rId14"/>
+    <p:sldId id="303" r:id="rId15"/>
+    <p:sldId id="304" r:id="rId16"/>
+    <p:sldId id="305" r:id="rId17"/>
+    <p:sldId id="287" r:id="rId18"/>
+    <p:sldId id="286" r:id="rId19"/>
   </p:sldIdLst>
   <p:sldSz cx="9144000" cy="5143500" type="screen16x9"/>
   <p:notesSz cx="6858000" cy="9144000"/>
@@ -211,7 +212,7 @@
           <a:p>
             <a:fld id="{B5389E1E-C654-E943-9883-792E99AD7287}" type="datetimeFigureOut">
               <a:rPr lang="en-US" smtClean="0"/>
-              <a:t>5/30/15</a:t>
+              <a:t>6/1/15</a:t>
             </a:fld>
             <a:endParaRPr lang="en-US"/>
           </a:p>
@@ -377,7 +378,7 @@
           <a:p>
             <a:fld id="{9920D99B-2862-464A-984E-65BFC5FC0BBC}" type="datetimeFigureOut">
               <a:rPr lang="en-US" smtClean="0"/>
-              <a:t>5/30/15</a:t>
+              <a:t>6/1/15</a:t>
             </a:fld>
             <a:endParaRPr lang="en-US"/>
           </a:p>
@@ -719,7 +720,7 @@
           <a:p>
             <a:fld id="{F39351FC-18D6-4741-8EEB-9FDB1F020AAC}" type="slidenum">
               <a:rPr lang="en-US" smtClean="0"/>
-              <a:t>11</a:t>
+              <a:t>12</a:t>
             </a:fld>
             <a:endParaRPr lang="en-US"/>
           </a:p>
@@ -1425,6 +1426,62 @@
               <a:t>‹#›</a:t>
             </a:fld>
             <a:endParaRPr lang="en-US" dirty="0"/>
+          </a:p>
+        </p:txBody>
+      </p:sp>
+      <p:sp>
+        <p:nvSpPr>
+          <p:cNvPr id="6" name="TextBox 5"/>
+          <p:cNvSpPr txBox="1"/>
+          <p:nvPr userDrawn="1"/>
+        </p:nvSpPr>
+        <p:spPr>
+          <a:xfrm>
+            <a:off x="6271578" y="4767263"/>
+            <a:ext cx="2415222" cy="230832"/>
+          </a:xfrm>
+          <a:prstGeom prst="rect">
+            <a:avLst/>
+          </a:prstGeom>
+          <a:noFill/>
+        </p:spPr>
+        <p:txBody>
+          <a:bodyPr wrap="square" rtlCol="0">
+            <a:spAutoFit/>
+          </a:bodyPr>
+          <a:lstStyle/>
+          <a:p>
+            <a:r>
+              <a:rPr lang="en-US" sz="900" dirty="0" smtClean="0">
+                <a:hlinkClick r:id="rId3"/>
+              </a:rPr>
+              <a:t>https://</a:t>
+            </a:r>
+            <a:r>
+              <a:rPr lang="en-US" sz="900" dirty="0" err="1" smtClean="0">
+                <a:hlinkClick r:id="rId3"/>
+              </a:rPr>
+              <a:t>github.com</a:t>
+            </a:r>
+            <a:r>
+              <a:rPr lang="en-US" sz="900" dirty="0" smtClean="0">
+                <a:hlinkClick r:id="rId3"/>
+              </a:rPr>
+              <a:t>/</a:t>
+            </a:r>
+            <a:r>
+              <a:rPr lang="en-US" sz="900" dirty="0" err="1" smtClean="0">
+                <a:hlinkClick r:id="rId3"/>
+              </a:rPr>
+              <a:t>couchbaselabs</a:t>
+            </a:r>
+            <a:r>
+              <a:rPr lang="en-US" sz="900" dirty="0" smtClean="0">
+                <a:hlinkClick r:id="rId3"/>
+              </a:rPr>
+              <a:t>/Workshop</a:t>
+            </a:r>
+            <a:endParaRPr lang="en-US" sz="900" dirty="0"/>
           </a:p>
         </p:txBody>
       </p:sp>
@@ -1911,6 +1968,62 @@
           </a:p>
         </p:txBody>
       </p:sp>
+      <p:sp>
+        <p:nvSpPr>
+          <p:cNvPr id="12" name="TextBox 11"/>
+          <p:cNvSpPr txBox="1"/>
+          <p:nvPr userDrawn="1"/>
+        </p:nvSpPr>
+        <p:spPr>
+          <a:xfrm>
+            <a:off x="6271578" y="4767263"/>
+            <a:ext cx="2415222" cy="230832"/>
+          </a:xfrm>
+          <a:prstGeom prst="rect">
+            <a:avLst/>
+          </a:prstGeom>
+          <a:noFill/>
+        </p:spPr>
+        <p:txBody>
+          <a:bodyPr wrap="square" rtlCol="0">
+            <a:spAutoFit/>
+          </a:bodyPr>
+          <a:lstStyle/>
+          <a:p>
+            <a:r>
+              <a:rPr lang="en-US" sz="900" dirty="0" smtClean="0">
+                <a:hlinkClick r:id="rId3"/>
+              </a:rPr>
+              <a:t>https://</a:t>
+            </a:r>
+            <a:r>
+              <a:rPr lang="en-US" sz="900" dirty="0" err="1" smtClean="0">
+                <a:hlinkClick r:id="rId3"/>
+              </a:rPr>
+              <a:t>github.com</a:t>
+            </a:r>
+            <a:r>
+              <a:rPr lang="en-US" sz="900" dirty="0" smtClean="0">
+                <a:hlinkClick r:id="rId3"/>
+              </a:rPr>
+              <a:t>/</a:t>
+            </a:r>
+            <a:r>
+              <a:rPr lang="en-US" sz="900" dirty="0" err="1" smtClean="0">
+                <a:hlinkClick r:id="rId3"/>
+              </a:rPr>
+              <a:t>couchbaselabs</a:t>
+            </a:r>
+            <a:r>
+              <a:rPr lang="en-US" sz="900" dirty="0" smtClean="0">
+                <a:hlinkClick r:id="rId3"/>
+              </a:rPr>
+              <a:t>/Workshop</a:t>
+            </a:r>
+            <a:endParaRPr lang="en-US" sz="900" dirty="0"/>
+          </a:p>
+        </p:txBody>
+      </p:sp>
     </p:spTree>
     <p:extLst>
       <p:ext uri="{BB962C8B-B14F-4D97-AF65-F5344CB8AC3E}">
@@ -2264,6 +2377,62 @@
               <a:t>‹#›</a:t>
             </a:fld>
             <a:endParaRPr lang="en-US" dirty="0"/>
+          </a:p>
+        </p:txBody>
+      </p:sp>
+      <p:sp>
+        <p:nvSpPr>
+          <p:cNvPr id="10" name="TextBox 9"/>
+          <p:cNvSpPr txBox="1"/>
+          <p:nvPr userDrawn="1"/>
+        </p:nvSpPr>
+        <p:spPr>
+          <a:xfrm>
+            <a:off x="6271578" y="4767263"/>
+            <a:ext cx="2415222" cy="230832"/>
+          </a:xfrm>
+          <a:prstGeom prst="rect">
+            <a:avLst/>
+          </a:prstGeom>
+          <a:noFill/>
+        </p:spPr>
+        <p:txBody>
+          <a:bodyPr wrap="square" rtlCol="0">
+            <a:spAutoFit/>
+          </a:bodyPr>
+          <a:lstStyle/>
+          <a:p>
+            <a:r>
+              <a:rPr lang="en-US" sz="900" dirty="0" smtClean="0">
+                <a:hlinkClick r:id="rId3"/>
+              </a:rPr>
+              <a:t>https://</a:t>
+            </a:r>
+            <a:r>
+              <a:rPr lang="en-US" sz="900" dirty="0" err="1" smtClean="0">
+                <a:hlinkClick r:id="rId3"/>
+              </a:rPr>
+              <a:t>github.com</a:t>
+            </a:r>
+            <a:r>
+              <a:rPr lang="en-US" sz="900" dirty="0" smtClean="0">
+                <a:hlinkClick r:id="rId3"/>
+              </a:rPr>
+              <a:t>/</a:t>
+            </a:r>
+            <a:r>
+              <a:rPr lang="en-US" sz="900" dirty="0" err="1" smtClean="0">
+                <a:hlinkClick r:id="rId3"/>
+              </a:rPr>
+              <a:t>couchbaselabs</a:t>
+            </a:r>
+            <a:r>
+              <a:rPr lang="en-US" sz="900" dirty="0" smtClean="0">
+                <a:hlinkClick r:id="rId3"/>
+              </a:rPr>
+              <a:t>/Workshop</a:t>
+            </a:r>
+            <a:endParaRPr lang="en-US" sz="900" dirty="0"/>
           </a:p>
         </p:txBody>
       </p:sp>
@@ -2961,6 +3130,62 @@
               <a:t>‹#›</a:t>
             </a:fld>
             <a:endParaRPr lang="en-US" dirty="0"/>
+          </a:p>
+        </p:txBody>
+      </p:sp>
+      <p:sp>
+        <p:nvSpPr>
+          <p:cNvPr id="7" name="TextBox 6"/>
+          <p:cNvSpPr txBox="1"/>
+          <p:nvPr userDrawn="1"/>
+        </p:nvSpPr>
+        <p:spPr>
+          <a:xfrm>
+            <a:off x="6271578" y="4767263"/>
+            <a:ext cx="2415222" cy="230832"/>
+          </a:xfrm>
+          <a:prstGeom prst="rect">
+            <a:avLst/>
+          </a:prstGeom>
+          <a:noFill/>
+        </p:spPr>
+        <p:txBody>
+          <a:bodyPr wrap="square" rtlCol="0">
+            <a:spAutoFit/>
+          </a:bodyPr>
+          <a:lstStyle/>
+          <a:p>
+            <a:r>
+              <a:rPr lang="en-US" sz="900" dirty="0" smtClean="0">
+                <a:hlinkClick r:id="rId2"/>
+              </a:rPr>
+              <a:t>https://</a:t>
+            </a:r>
+            <a:r>
+              <a:rPr lang="en-US" sz="900" dirty="0" err="1" smtClean="0">
+                <a:hlinkClick r:id="rId2"/>
+              </a:rPr>
+              <a:t>github.com</a:t>
+            </a:r>
+            <a:r>
+              <a:rPr lang="en-US" sz="900" dirty="0" smtClean="0">
+                <a:hlinkClick r:id="rId2"/>
+              </a:rPr>
+              <a:t>/</a:t>
+            </a:r>
+            <a:r>
+              <a:rPr lang="en-US" sz="900" dirty="0" err="1" smtClean="0">
+                <a:hlinkClick r:id="rId2"/>
+              </a:rPr>
+              <a:t>couchbaselabs</a:t>
+            </a:r>
+            <a:r>
+              <a:rPr lang="en-US" sz="900" dirty="0" smtClean="0">
+                <a:hlinkClick r:id="rId2"/>
+              </a:rPr>
+              <a:t>/Workshop</a:t>
+            </a:r>
+            <a:endParaRPr lang="en-US" sz="900" dirty="0"/>
           </a:p>
         </p:txBody>
       </p:sp>
@@ -3503,11 +3728,7 @@
           <a:p>
             <a:r>
               <a:rPr lang="en-US" dirty="0" smtClean="0"/>
-              <a:t>Lab: </a:t>
-            </a:r>
-            <a:r>
-              <a:rPr lang="en-US" dirty="0" smtClean="0"/>
-              <a:t>Setup Environment</a:t>
+              <a:t>Lab: Setup Environment</a:t>
             </a:r>
             <a:endParaRPr lang="en-US" dirty="0"/>
           </a:p>
@@ -3586,6 +3807,190 @@
           <a:p>
             <a:r>
               <a:rPr lang="en-US" dirty="0" smtClean="0"/>
+              <a:t>Steps 4 &amp; 5</a:t>
+            </a:r>
+            <a:endParaRPr lang="en-US" dirty="0"/>
+          </a:p>
+        </p:txBody>
+      </p:sp>
+      <p:pic>
+        <p:nvPicPr>
+          <p:cNvPr id="3" name="Picture 2" descr="4 of 5 – Register and agree to TnCs.png"/>
+          <p:cNvPicPr>
+            <a:picLocks noChangeAspect="1"/>
+          </p:cNvPicPr>
+          <p:nvPr/>
+        </p:nvPicPr>
+        <p:blipFill>
+          <a:blip r:embed="rId2" cstate="print">
+            <a:extLst>
+              <a:ext uri="{28A0092B-C50C-407E-A947-70E740481C1C}">
+                <a14:useLocalDpi xmlns:a14="http://schemas.microsoft.com/office/drawing/2010/main"/>
+              </a:ext>
+            </a:extLst>
+          </a:blip>
+          <a:stretch>
+            <a:fillRect/>
+          </a:stretch>
+        </p:blipFill>
+        <p:spPr>
+          <a:xfrm>
+            <a:off x="261726" y="713792"/>
+            <a:ext cx="4114800" cy="3506124"/>
+          </a:xfrm>
+          <a:prstGeom prst="rect">
+            <a:avLst/>
+          </a:prstGeom>
+        </p:spPr>
+      </p:pic>
+      <p:pic>
+        <p:nvPicPr>
+          <p:cNvPr id="4" name="Picture 3" descr="5 of 5 – Set up Administrator.png"/>
+          <p:cNvPicPr>
+            <a:picLocks noChangeAspect="1"/>
+          </p:cNvPicPr>
+          <p:nvPr/>
+        </p:nvPicPr>
+        <p:blipFill>
+          <a:blip r:embed="rId3" cstate="print">
+            <a:extLst>
+              <a:ext uri="{28A0092B-C50C-407E-A947-70E740481C1C}">
+                <a14:useLocalDpi xmlns:a14="http://schemas.microsoft.com/office/drawing/2010/main"/>
+              </a:ext>
+            </a:extLst>
+          </a:blip>
+          <a:stretch>
+            <a:fillRect/>
+          </a:stretch>
+        </p:blipFill>
+        <p:spPr>
+          <a:xfrm>
+            <a:off x="4743857" y="713793"/>
+            <a:ext cx="4114800" cy="3506123"/>
+          </a:xfrm>
+          <a:prstGeom prst="rect">
+            <a:avLst/>
+          </a:prstGeom>
+        </p:spPr>
+      </p:pic>
+      <p:sp>
+        <p:nvSpPr>
+          <p:cNvPr id="5" name="TextBox 4"/>
+          <p:cNvSpPr txBox="1"/>
+          <p:nvPr/>
+        </p:nvSpPr>
+        <p:spPr>
+          <a:xfrm>
+            <a:off x="470896" y="4041321"/>
+            <a:ext cx="3679286" cy="646331"/>
+          </a:xfrm>
+          <a:prstGeom prst="rect">
+            <a:avLst/>
+          </a:prstGeom>
+          <a:noFill/>
+        </p:spPr>
+        <p:txBody>
+          <a:bodyPr wrap="square" rtlCol="0">
+            <a:spAutoFit/>
+          </a:bodyPr>
+          <a:lstStyle/>
+          <a:p>
+            <a:r>
+              <a:rPr lang="en-US" dirty="0" smtClean="0"/>
+              <a:t>Register for update notifications and do product registration.</a:t>
+            </a:r>
+            <a:endParaRPr lang="en-US" i="1" dirty="0"/>
+          </a:p>
+        </p:txBody>
+      </p:sp>
+      <p:sp>
+        <p:nvSpPr>
+          <p:cNvPr id="6" name="TextBox 5"/>
+          <p:cNvSpPr txBox="1"/>
+          <p:nvPr/>
+        </p:nvSpPr>
+        <p:spPr>
+          <a:xfrm>
+            <a:off x="4963784" y="4041321"/>
+            <a:ext cx="3679286" cy="646331"/>
+          </a:xfrm>
+          <a:prstGeom prst="rect">
+            <a:avLst/>
+          </a:prstGeom>
+          <a:noFill/>
+        </p:spPr>
+        <p:txBody>
+          <a:bodyPr wrap="square" rtlCol="0">
+            <a:spAutoFit/>
+          </a:bodyPr>
+          <a:lstStyle/>
+          <a:p>
+            <a:r>
+              <a:rPr lang="en-US" dirty="0" smtClean="0"/>
+              <a:t>Set a password.  Any will do but </a:t>
+            </a:r>
+            <a:r>
+              <a:rPr lang="en-US" i="1" dirty="0" smtClean="0"/>
+              <a:t>be sure you remember it.</a:t>
+            </a:r>
+            <a:endParaRPr lang="en-US" i="1" dirty="0"/>
+          </a:p>
+        </p:txBody>
+      </p:sp>
+    </p:spTree>
+    <p:extLst>
+      <p:ext uri="{BB962C8B-B14F-4D97-AF65-F5344CB8AC3E}">
+        <p14:creationId xmlns:p14="http://schemas.microsoft.com/office/powerpoint/2010/main" val="2571533586"/>
+      </p:ext>
+    </p:extLst>
+  </p:cSld>
+  <p:clrMapOvr>
+    <a:masterClrMapping/>
+  </p:clrMapOvr>
+  <p:timing>
+    <p:tnLst>
+      <p:par>
+        <p:cTn xmlns:p14="http://schemas.microsoft.com/office/powerpoint/2010/main" id="1" dur="indefinite" restart="never" nodeType="tmRoot"/>
+      </p:par>
+    </p:tnLst>
+  </p:timing>
+</p:sld>
+</file>
+
+<file path=ppt/slides/slide11.xml><?xml version="1.0" encoding="utf-8"?>
+<p:sld xmlns:a="http://schemas.openxmlformats.org/drawingml/2006/main" xmlns:r="http://schemas.openxmlformats.org/officeDocument/2006/relationships" xmlns:p="http://schemas.openxmlformats.org/presentationml/2006/main">
+  <p:cSld>
+    <p:spTree>
+      <p:nvGrpSpPr>
+        <p:cNvPr id="1" name=""/>
+        <p:cNvGrpSpPr/>
+        <p:nvPr/>
+      </p:nvGrpSpPr>
+      <p:grpSpPr>
+        <a:xfrm>
+          <a:off x="0" y="0"/>
+          <a:ext cx="0" cy="0"/>
+          <a:chOff x="0" y="0"/>
+          <a:chExt cx="0" cy="0"/>
+        </a:xfrm>
+      </p:grpSpPr>
+      <p:sp>
+        <p:nvSpPr>
+          <p:cNvPr id="2" name="Title 1"/>
+          <p:cNvSpPr>
+            <a:spLocks noGrp="1"/>
+          </p:cNvSpPr>
+          <p:nvPr>
+            <p:ph type="title"/>
+          </p:nvPr>
+        </p:nvSpPr>
+        <p:spPr/>
+        <p:txBody>
+          <a:bodyPr/>
+          <a:lstStyle/>
+          <a:p>
+            <a:r>
+              <a:rPr lang="en-US" dirty="0" smtClean="0"/>
               <a:t>Explore, Verify and Study Documents</a:t>
             </a:r>
             <a:endParaRPr lang="en-US" dirty="0"/>
@@ -3764,7 +4169,7 @@
         </p:nvSpPr>
         <p:spPr>
           <a:xfrm>
-            <a:off x="5848486" y="4407438"/>
+            <a:off x="5848486" y="4273200"/>
             <a:ext cx="2831097" cy="523220"/>
           </a:xfrm>
           <a:prstGeom prst="rect">
@@ -3810,10 +4215,17 @@
   <p:clrMapOvr>
     <a:masterClrMapping/>
   </p:clrMapOvr>
+  <p:timing>
+    <p:tnLst>
+      <p:par>
+        <p:cTn xmlns:p14="http://schemas.microsoft.com/office/powerpoint/2010/main" id="1" dur="indefinite" restart="never" nodeType="tmRoot"/>
+      </p:par>
+    </p:tnLst>
+  </p:timing>
 </p:sld>
 </file>
 
-<file path=ppt/slides/slide11.xml><?xml version="1.0" encoding="utf-8"?>
+<file path=ppt/slides/slide12.xml><?xml version="1.0" encoding="utf-8"?>
 <p:sld xmlns:a="http://schemas.openxmlformats.org/drawingml/2006/main" xmlns:r="http://schemas.openxmlformats.org/officeDocument/2006/relationships" xmlns:p="http://schemas.openxmlformats.org/presentationml/2006/main">
   <p:cSld>
     <p:spTree>
@@ -3900,7 +4312,7 @@
         <p:spPr>
           <a:xfrm>
             <a:off x="5111194" y="1144166"/>
-            <a:ext cx="3746810" cy="1846659"/>
+            <a:ext cx="3746810" cy="2000548"/>
           </a:xfrm>
           <a:prstGeom prst="rect">
             <a:avLst/>
@@ -3929,13 +4341,31 @@
               <a:t>shell&gt; </a:t>
             </a:r>
             <a:r>
+              <a:rPr lang="en-US" sz="1000" b="1" dirty="0">
+                <a:solidFill>
+                  <a:srgbClr val="536870"/>
+                </a:solidFill>
+                <a:latin typeface="Menlo-Regular"/>
+              </a:rPr>
+              <a:t>C:\Program Files\Couchbase\Server\bin\</a:t>
+            </a:r>
+            <a:r>
+              <a:rPr lang="en-US" sz="1000" b="1" dirty="0" err="1" smtClean="0">
+                <a:solidFill>
+                  <a:srgbClr val="536870"/>
+                </a:solidFill>
+                <a:latin typeface="Menlo-Regular"/>
+              </a:rPr>
+              <a:t>cbq.exe</a:t>
+            </a:r>
+            <a:r>
               <a:rPr lang="en-US" sz="1000" b="1" dirty="0" smtClean="0">
                 <a:solidFill>
                   <a:srgbClr val="536870"/>
                 </a:solidFill>
                 <a:latin typeface="Menlo-Regular"/>
               </a:rPr>
-              <a:t>//TODO</a:t>
+              <a:t/>
             </a:r>
             <a:br>
               <a:rPr lang="en-US" sz="1000" b="1" dirty="0" smtClean="0">
@@ -4057,7 +4487,34 @@
                 </a:solidFill>
                 <a:latin typeface="Menlo-Regular"/>
               </a:rPr>
-              <a:t>//TODO</a:t>
+              <a:t>/opt/</a:t>
+            </a:r>
+            <a:r>
+              <a:rPr lang="en-US" sz="1000" b="1" dirty="0" err="1" smtClean="0">
+                <a:solidFill>
+                  <a:srgbClr val="536870"/>
+                </a:solidFill>
+                <a:latin typeface="Menlo-Regular"/>
+              </a:rPr>
+              <a:t>couchbase</a:t>
+            </a:r>
+            <a:r>
+              <a:rPr lang="en-US" sz="1000" b="1" dirty="0" smtClean="0">
+                <a:solidFill>
+                  <a:srgbClr val="536870"/>
+                </a:solidFill>
+                <a:latin typeface="Menlo-Regular"/>
+              </a:rPr>
+              <a:t>/bin/</a:t>
+            </a:r>
+            <a:r>
+              <a:rPr lang="en-US" sz="1000" b="1" dirty="0" err="1" smtClean="0">
+                <a:solidFill>
+                  <a:srgbClr val="536870"/>
+                </a:solidFill>
+                <a:latin typeface="Menlo-Regular"/>
+              </a:rPr>
+              <a:t>cbq</a:t>
             </a:r>
             <a:endParaRPr lang="en-US" sz="1000" b="1" dirty="0"/>
           </a:p>
@@ -4073,10 +4530,17 @@
   <p:clrMapOvr>
     <a:masterClrMapping/>
   </p:clrMapOvr>
+  <p:timing>
+    <p:tnLst>
+      <p:par>
+        <p:cTn xmlns:p14="http://schemas.microsoft.com/office/powerpoint/2010/main" id="1" dur="indefinite" restart="never" nodeType="tmRoot"/>
+      </p:par>
+    </p:tnLst>
+  </p:timing>
 </p:sld>
 </file>
 
-<file path=ppt/slides/slide12.xml><?xml version="1.0" encoding="utf-8"?>
+<file path=ppt/slides/slide13.xml><?xml version="1.0" encoding="utf-8"?>
 <p:sld xmlns:a="http://schemas.openxmlformats.org/drawingml/2006/main" xmlns:r="http://schemas.openxmlformats.org/officeDocument/2006/relationships" xmlns:p="http://schemas.openxmlformats.org/presentationml/2006/main">
   <p:cSld>
     <p:spTree>
@@ -4240,10 +4704,17 @@
   <p:clrMapOvr>
     <a:masterClrMapping/>
   </p:clrMapOvr>
+  <p:timing>
+    <p:tnLst>
+      <p:par>
+        <p:cTn xmlns:p14="http://schemas.microsoft.com/office/powerpoint/2010/main" id="1" dur="indefinite" restart="never" nodeType="tmRoot"/>
+      </p:par>
+    </p:tnLst>
+  </p:timing>
 </p:sld>
 </file>
 
-<file path=ppt/slides/slide13.xml><?xml version="1.0" encoding="utf-8"?>
+<file path=ppt/slides/slide14.xml><?xml version="1.0" encoding="utf-8"?>
 <p:sld xmlns:a="http://schemas.openxmlformats.org/drawingml/2006/main" xmlns:r="http://schemas.openxmlformats.org/officeDocument/2006/relationships" xmlns:p="http://schemas.openxmlformats.org/presentationml/2006/main">
   <p:cSld>
     <p:spTree>
@@ -4337,8 +4808,9 @@
           <a:p>
             <a:r>
               <a:rPr lang="en-US" dirty="0" smtClean="0"/>
-              <a:t>Execute a simple select:</a:t>
-            </a:r>
+              <a:t>Create a primary index:</a:t>
+            </a:r>
+            <a:endParaRPr lang="en-US" dirty="0" smtClean="0"/>
           </a:p>
           <a:p>
             <a:r>
@@ -4357,7 +4829,7 @@
                 </a:solidFill>
                 <a:latin typeface="Menlo-Regular"/>
               </a:rPr>
-              <a:t>CREATE PRIMARY INDEX on `travel-sample`;</a:t>
+              <a:t>CREATE PRIMARY INDEX on `travel-sample` USING GSI;</a:t>
             </a:r>
           </a:p>
           <a:p>
@@ -4395,16 +4867,8 @@
           </a:p>
           <a:p>
             <a:r>
-              <a:rPr lang="en-US" sz="1400" dirty="0"/>
-              <a:t>Execute a </a:t>
-            </a:r>
-            <a:r>
               <a:rPr lang="en-US" dirty="0"/>
-              <a:t>simple</a:t>
-            </a:r>
-            <a:r>
-              <a:rPr lang="en-US" sz="1400" dirty="0"/>
-              <a:t> select:</a:t>
+              <a:t>Execute a simple select:</a:t>
             </a:r>
           </a:p>
           <a:p>
@@ -4452,100 +4916,13 @@
   <p:clrMapOvr>
     <a:masterClrMapping/>
   </p:clrMapOvr>
-</p:sld>
-</file>
-
-<file path=ppt/slides/slide14.xml><?xml version="1.0" encoding="utf-8"?>
-<p:sld xmlns:a="http://schemas.openxmlformats.org/drawingml/2006/main" xmlns:r="http://schemas.openxmlformats.org/officeDocument/2006/relationships" xmlns:p="http://schemas.openxmlformats.org/presentationml/2006/main">
-  <p:cSld>
-    <p:spTree>
-      <p:nvGrpSpPr>
-        <p:cNvPr id="1" name=""/>
-        <p:cNvGrpSpPr/>
-        <p:nvPr/>
-      </p:nvGrpSpPr>
-      <p:grpSpPr>
-        <a:xfrm>
-          <a:off x="0" y="0"/>
-          <a:ext cx="0" cy="0"/>
-          <a:chOff x="0" y="0"/>
-          <a:chExt cx="0" cy="0"/>
-        </a:xfrm>
-      </p:grpSpPr>
-      <p:sp>
-        <p:nvSpPr>
-          <p:cNvPr id="2" name="Title 1"/>
-          <p:cNvSpPr>
-            <a:spLocks noGrp="1"/>
-          </p:cNvSpPr>
-          <p:nvPr>
-            <p:ph type="title"/>
-          </p:nvPr>
-        </p:nvSpPr>
-        <p:spPr/>
-        <p:txBody>
-          <a:bodyPr/>
-          <a:lstStyle/>
-          <a:p>
-            <a:r>
-              <a:rPr lang="en-US" dirty="0" smtClean="0"/>
-              <a:t>Some Queries to Try</a:t>
-            </a:r>
-            <a:endParaRPr lang="en-US" dirty="0"/>
-          </a:p>
-        </p:txBody>
-      </p:sp>
-      <p:sp>
-        <p:nvSpPr>
-          <p:cNvPr id="3" name="Content Placeholder 2"/>
-          <p:cNvSpPr>
-            <a:spLocks noGrp="1"/>
-          </p:cNvSpPr>
-          <p:nvPr>
-            <p:ph idx="1"/>
-          </p:nvPr>
-        </p:nvSpPr>
-        <p:spPr/>
-        <p:txBody>
-          <a:bodyPr/>
-          <a:lstStyle/>
-          <a:p>
-            <a:r>
-              <a:rPr lang="en-US" dirty="0" smtClean="0"/>
-              <a:t>How many airports are in the `travel-sample`?</a:t>
-            </a:r>
-          </a:p>
-          <a:p>
-            <a:endParaRPr lang="en-US" dirty="0"/>
-          </a:p>
-          <a:p>
-            <a:r>
-              <a:rPr lang="en-US" dirty="0" smtClean="0"/>
-              <a:t>What are the different distinct document “types” in the `travel-sample?</a:t>
-            </a:r>
-          </a:p>
-          <a:p>
-            <a:endParaRPr lang="en-US" dirty="0"/>
-          </a:p>
-          <a:p>
-            <a:r>
-              <a:rPr lang="en-US" dirty="0" smtClean="0"/>
-              <a:t>What are the “names” of places one can eat as an “activity” in the “city” of London?</a:t>
-            </a:r>
-            <a:endParaRPr lang="en-US" dirty="0"/>
-          </a:p>
-        </p:txBody>
-      </p:sp>
-    </p:spTree>
-    <p:extLst>
-      <p:ext uri="{BB962C8B-B14F-4D97-AF65-F5344CB8AC3E}">
-        <p14:creationId xmlns:p14="http://schemas.microsoft.com/office/powerpoint/2010/main" val="3710899390"/>
-      </p:ext>
-    </p:extLst>
-  </p:cSld>
-  <p:clrMapOvr>
-    <a:masterClrMapping/>
-  </p:clrMapOvr>
+  <p:timing>
+    <p:tnLst>
+      <p:par>
+        <p:cTn xmlns:p14="http://schemas.microsoft.com/office/powerpoint/2010/main" id="1" dur="indefinite" restart="never" nodeType="tmRoot"/>
+      </p:par>
+    </p:tnLst>
+  </p:timing>
 </p:sld>
 </file>
 
@@ -4599,12 +4976,7 @@
             <p:ph idx="1"/>
           </p:nvPr>
         </p:nvSpPr>
-        <p:spPr>
-          <a:xfrm>
-            <a:off x="457200" y="685800"/>
-            <a:ext cx="8007739" cy="4142792"/>
-          </a:xfrm>
-        </p:spPr>
+        <p:spPr/>
         <p:txBody>
           <a:bodyPr/>
           <a:lstStyle/>
@@ -4615,71 +4987,15 @@
             </a:r>
           </a:p>
           <a:p>
-            <a:pPr marL="230188" indent="0">
-              <a:buNone/>
-            </a:pPr>
-            <a:r>
-              <a:rPr lang="en-US" sz="1800" dirty="0">
-                <a:latin typeface="Consolas"/>
-                <a:cs typeface="Consolas"/>
-              </a:rPr>
-              <a:t>SELECT COUNT(</a:t>
-            </a:r>
-            <a:r>
-              <a:rPr lang="en-US" sz="1800" dirty="0" err="1">
-                <a:latin typeface="Consolas"/>
-                <a:cs typeface="Consolas"/>
-              </a:rPr>
-              <a:t>airportname</a:t>
-            </a:r>
-            <a:r>
-              <a:rPr lang="en-US" sz="1800" dirty="0">
-                <a:latin typeface="Consolas"/>
-                <a:cs typeface="Consolas"/>
-              </a:rPr>
-              <a:t>) FROM `travel-sample` WHERE type="airport";</a:t>
-            </a:r>
-            <a:endParaRPr lang="en-US" sz="1800" dirty="0" smtClean="0">
-              <a:latin typeface="Consolas"/>
-              <a:cs typeface="Consolas"/>
-            </a:endParaRPr>
-          </a:p>
-          <a:p>
             <a:endParaRPr lang="en-US" dirty="0"/>
           </a:p>
           <a:p>
             <a:r>
               <a:rPr lang="en-US" dirty="0" smtClean="0"/>
-              <a:t>What are the different distinct document “types” in the `travel-sample?</a:t>
-            </a:r>
-          </a:p>
-          <a:p>
-            <a:pPr marL="230188" indent="0">
-              <a:buNone/>
-            </a:pPr>
-            <a:r>
-              <a:rPr lang="en-US" sz="1800" dirty="0" smtClean="0">
-                <a:latin typeface="Consolas"/>
-                <a:cs typeface="Consolas"/>
-              </a:rPr>
-              <a:t>select </a:t>
-            </a:r>
-            <a:r>
-              <a:rPr lang="en-US" sz="1800" dirty="0">
-                <a:latin typeface="Consolas"/>
-                <a:cs typeface="Consolas"/>
-              </a:rPr>
-              <a:t>DISTINCT type FROM `travel-sample`;</a:t>
-            </a:r>
-            <a:endParaRPr lang="en-US" sz="1800" dirty="0" smtClean="0">
-              <a:latin typeface="Consolas"/>
-              <a:cs typeface="Consolas"/>
-            </a:endParaRPr>
-          </a:p>
-          <a:p>
-            <a:pPr marL="0" indent="0">
-              <a:buNone/>
-            </a:pPr>
+              <a:t>What are the different distinct document types (as represented by “type”) in the `travel-sample`?</a:t>
+            </a:r>
+          </a:p>
+          <a:p>
             <a:endParaRPr lang="en-US" dirty="0"/>
           </a:p>
           <a:p>
@@ -4687,58 +5003,97 @@
               <a:rPr lang="en-US" dirty="0" smtClean="0"/>
               <a:t>What are the “names” of places one can eat as an “activity” in the “city” of London?</a:t>
             </a:r>
-          </a:p>
-          <a:p>
-            <a:pPr marL="230188" indent="0">
-              <a:buNone/>
-            </a:pPr>
-            <a:r>
-              <a:rPr lang="en-US" sz="1800" dirty="0" smtClean="0">
-                <a:latin typeface="Consolas"/>
-                <a:cs typeface="Consolas"/>
-              </a:rPr>
-              <a:t>SELECT name FROM `</a:t>
-            </a:r>
-            <a:r>
-              <a:rPr lang="en-US" sz="1800" dirty="0">
-                <a:latin typeface="Consolas"/>
-                <a:cs typeface="Consolas"/>
-              </a:rPr>
-              <a:t>travel-sample` </a:t>
-            </a:r>
-            <a:r>
-              <a:rPr lang="en-US" sz="1800" dirty="0" smtClean="0">
-                <a:latin typeface="Consolas"/>
-                <a:cs typeface="Consolas"/>
-              </a:rPr>
-              <a:t>WHERE activity = "eat" AND </a:t>
-            </a:r>
-            <a:r>
-              <a:rPr lang="en-US" sz="1800" dirty="0">
-                <a:latin typeface="Consolas"/>
-                <a:cs typeface="Consolas"/>
-              </a:rPr>
-              <a:t>city = "London";</a:t>
-            </a:r>
-          </a:p>
-          <a:p>
-            <a:endParaRPr lang="en-US" dirty="0" smtClean="0"/>
-          </a:p>
-          <a:p>
             <a:endParaRPr lang="en-US" dirty="0"/>
+          </a:p>
+        </p:txBody>
+      </p:sp>
+      <p:sp>
+        <p:nvSpPr>
+          <p:cNvPr id="5" name="TextBox 4"/>
+          <p:cNvSpPr txBox="1"/>
+          <p:nvPr/>
+        </p:nvSpPr>
+        <p:spPr>
+          <a:xfrm>
+            <a:off x="1227946" y="4326590"/>
+            <a:ext cx="6706475" cy="461665"/>
+          </a:xfrm>
+          <a:prstGeom prst="rect">
+            <a:avLst/>
+          </a:prstGeom>
+          <a:noFill/>
+        </p:spPr>
+        <p:txBody>
+          <a:bodyPr wrap="square" rtlCol="0">
+            <a:spAutoFit/>
+          </a:bodyPr>
+          <a:lstStyle/>
+          <a:p>
+            <a:pPr algn="ctr"/>
+            <a:r>
+              <a:rPr lang="en-US" sz="1200" i="1" dirty="0" smtClean="0"/>
+              <a:t>Refer to the N1QL </a:t>
+            </a:r>
+            <a:r>
+              <a:rPr lang="en-US" sz="1200" i="1" dirty="0" err="1" smtClean="0"/>
+              <a:t>Cheatsheet</a:t>
+            </a:r>
+            <a:r>
+              <a:rPr lang="en-US" sz="1200" i="1" dirty="0"/>
+              <a:t>: </a:t>
+            </a:r>
+            <a:r>
+              <a:rPr lang="en-US" sz="1200" dirty="0" smtClean="0"/>
+              <a:t/>
+            </a:r>
+            <a:br>
+              <a:rPr lang="en-US" sz="1200" dirty="0" smtClean="0"/>
+            </a:br>
+            <a:r>
+              <a:rPr lang="en-US" sz="1200" dirty="0" smtClean="0">
+                <a:hlinkClick r:id="rId2"/>
+              </a:rPr>
+              <a:t>http</a:t>
+            </a:r>
+            <a:r>
+              <a:rPr lang="en-US" sz="1200" dirty="0">
+                <a:hlinkClick r:id="rId2"/>
+              </a:rPr>
+              <a:t>://</a:t>
+            </a:r>
+            <a:r>
+              <a:rPr lang="en-US" sz="1200" dirty="0" err="1">
+                <a:hlinkClick r:id="rId2"/>
+              </a:rPr>
+              <a:t>docs.couchbase.com</a:t>
+            </a:r>
+            <a:r>
+              <a:rPr lang="en-US" sz="1200" dirty="0">
+                <a:hlinkClick r:id="rId2"/>
+              </a:rPr>
+              <a:t>/files/Couchbase-N1QL-CheatSheet.pdf</a:t>
+            </a:r>
+            <a:endParaRPr lang="en-US" sz="1200" dirty="0"/>
           </a:p>
         </p:txBody>
       </p:sp>
     </p:spTree>
     <p:extLst>
       <p:ext uri="{BB962C8B-B14F-4D97-AF65-F5344CB8AC3E}">
-        <p14:creationId xmlns:p14="http://schemas.microsoft.com/office/powerpoint/2010/main" val="2629752433"/>
+        <p14:creationId xmlns:p14="http://schemas.microsoft.com/office/powerpoint/2010/main" val="3710899390"/>
       </p:ext>
     </p:extLst>
   </p:cSld>
   <p:clrMapOvr>
     <a:masterClrMapping/>
   </p:clrMapOvr>
+  <p:timing>
+    <p:tnLst>
+      <p:par>
+        <p:cTn xmlns:p14="http://schemas.microsoft.com/office/powerpoint/2010/main" id="1" dur="indefinite" restart="never" nodeType="tmRoot"/>
+      </p:par>
+    </p:tnLst>
+  </p:timing>
 </p:sld>
 </file>
 
@@ -4766,6 +5121,286 @@
             <a:spLocks noGrp="1"/>
           </p:cNvSpPr>
           <p:nvPr>
+            <p:ph type="title"/>
+          </p:nvPr>
+        </p:nvSpPr>
+        <p:spPr/>
+        <p:txBody>
+          <a:bodyPr/>
+          <a:lstStyle/>
+          <a:p>
+            <a:r>
+              <a:rPr lang="en-US" dirty="0" smtClean="0"/>
+              <a:t>Some Queries to Try</a:t>
+            </a:r>
+            <a:endParaRPr lang="en-US" dirty="0"/>
+          </a:p>
+        </p:txBody>
+      </p:sp>
+      <p:sp>
+        <p:nvSpPr>
+          <p:cNvPr id="3" name="Content Placeholder 2"/>
+          <p:cNvSpPr>
+            <a:spLocks noGrp="1"/>
+          </p:cNvSpPr>
+          <p:nvPr>
+            <p:ph idx="1"/>
+          </p:nvPr>
+        </p:nvSpPr>
+        <p:spPr>
+          <a:xfrm>
+            <a:off x="457200" y="685800"/>
+            <a:ext cx="8007739" cy="4142792"/>
+          </a:xfrm>
+        </p:spPr>
+        <p:txBody>
+          <a:bodyPr/>
+          <a:lstStyle/>
+          <a:p>
+            <a:r>
+              <a:rPr lang="en-US" dirty="0" smtClean="0"/>
+              <a:t>How many airports are in the `travel-sample`?</a:t>
+            </a:r>
+          </a:p>
+          <a:p>
+            <a:pPr marL="230188" indent="0">
+              <a:buNone/>
+            </a:pPr>
+            <a:r>
+              <a:rPr lang="en-US" sz="1800" dirty="0">
+                <a:latin typeface="Consolas"/>
+                <a:cs typeface="Consolas"/>
+              </a:rPr>
+              <a:t>SELECT COUNT(</a:t>
+            </a:r>
+            <a:r>
+              <a:rPr lang="en-US" sz="1800" dirty="0" err="1">
+                <a:latin typeface="Consolas"/>
+                <a:cs typeface="Consolas"/>
+              </a:rPr>
+              <a:t>airportname</a:t>
+            </a:r>
+            <a:r>
+              <a:rPr lang="en-US" sz="1800" dirty="0">
+                <a:latin typeface="Consolas"/>
+                <a:cs typeface="Consolas"/>
+              </a:rPr>
+              <a:t>) FROM `travel-sample` WHERE type="</a:t>
+            </a:r>
+            <a:r>
+              <a:rPr lang="en-US" sz="1800" dirty="0" smtClean="0">
+                <a:latin typeface="Consolas"/>
+                <a:cs typeface="Consolas"/>
+              </a:rPr>
+              <a:t>airport”;</a:t>
+            </a:r>
+            <a:endParaRPr lang="en-US" sz="1800" dirty="0" smtClean="0">
+              <a:latin typeface="Consolas"/>
+              <a:cs typeface="Consolas"/>
+            </a:endParaRPr>
+          </a:p>
+          <a:p>
+            <a:pPr marL="230188" indent="0">
+              <a:buNone/>
+            </a:pPr>
+            <a:endParaRPr lang="en-US" sz="800" dirty="0"/>
+          </a:p>
+          <a:p>
+            <a:r>
+              <a:rPr lang="en-US" dirty="0"/>
+              <a:t>What are the different distinct document types (as represented by “type”) in the `travel-sample`?</a:t>
+            </a:r>
+          </a:p>
+          <a:p>
+            <a:pPr marL="230188" indent="0">
+              <a:buNone/>
+            </a:pPr>
+            <a:r>
+              <a:rPr lang="en-US" sz="1800" dirty="0" smtClean="0">
+                <a:latin typeface="Consolas"/>
+                <a:cs typeface="Consolas"/>
+              </a:rPr>
+              <a:t>select </a:t>
+            </a:r>
+            <a:r>
+              <a:rPr lang="en-US" sz="1800" dirty="0">
+                <a:latin typeface="Consolas"/>
+                <a:cs typeface="Consolas"/>
+              </a:rPr>
+              <a:t>DISTINCT type FROM `travel-sample`;</a:t>
+            </a:r>
+            <a:endParaRPr lang="en-US" sz="1800" dirty="0" smtClean="0">
+              <a:latin typeface="Consolas"/>
+              <a:cs typeface="Consolas"/>
+            </a:endParaRPr>
+          </a:p>
+          <a:p>
+            <a:pPr marL="0" indent="0">
+              <a:buNone/>
+            </a:pPr>
+            <a:endParaRPr lang="en-US" sz="800" dirty="0"/>
+          </a:p>
+          <a:p>
+            <a:r>
+              <a:rPr lang="en-US" dirty="0" smtClean="0"/>
+              <a:t>What are the “names” of places one can eat as an “activity” in the “city” of London?</a:t>
+            </a:r>
+          </a:p>
+          <a:p>
+            <a:pPr marL="230188" indent="0">
+              <a:buNone/>
+            </a:pPr>
+            <a:r>
+              <a:rPr lang="en-US" sz="1800" dirty="0" smtClean="0">
+                <a:latin typeface="Consolas"/>
+                <a:cs typeface="Consolas"/>
+              </a:rPr>
+              <a:t>SELECT name FROM `</a:t>
+            </a:r>
+            <a:r>
+              <a:rPr lang="en-US" sz="1800" dirty="0">
+                <a:latin typeface="Consolas"/>
+                <a:cs typeface="Consolas"/>
+              </a:rPr>
+              <a:t>travel-sample` </a:t>
+            </a:r>
+            <a:r>
+              <a:rPr lang="en-US" sz="1800" dirty="0" smtClean="0">
+                <a:latin typeface="Consolas"/>
+                <a:cs typeface="Consolas"/>
+              </a:rPr>
+              <a:t>WHERE activity = "eat" AND </a:t>
+            </a:r>
+            <a:r>
+              <a:rPr lang="en-US" sz="1800" dirty="0">
+                <a:latin typeface="Consolas"/>
+                <a:cs typeface="Consolas"/>
+              </a:rPr>
+              <a:t>city = "London";</a:t>
+            </a:r>
+          </a:p>
+          <a:p>
+            <a:endParaRPr lang="en-US" dirty="0" smtClean="0"/>
+          </a:p>
+          <a:p>
+            <a:endParaRPr lang="en-US" dirty="0"/>
+          </a:p>
+        </p:txBody>
+      </p:sp>
+      <p:sp>
+        <p:nvSpPr>
+          <p:cNvPr id="5" name="TextBox 4"/>
+          <p:cNvSpPr txBox="1"/>
+          <p:nvPr/>
+        </p:nvSpPr>
+        <p:spPr>
+          <a:xfrm>
+            <a:off x="1227946" y="4326590"/>
+            <a:ext cx="6706475" cy="461665"/>
+          </a:xfrm>
+          <a:prstGeom prst="rect">
+            <a:avLst/>
+          </a:prstGeom>
+          <a:noFill/>
+        </p:spPr>
+        <p:txBody>
+          <a:bodyPr wrap="square" rtlCol="0">
+            <a:spAutoFit/>
+          </a:bodyPr>
+          <a:lstStyle/>
+          <a:p>
+            <a:pPr algn="ctr"/>
+            <a:r>
+              <a:rPr lang="en-US" sz="1200" i="1" dirty="0" smtClean="0"/>
+              <a:t>Refer to the N1QL </a:t>
+            </a:r>
+            <a:r>
+              <a:rPr lang="en-US" sz="1200" i="1" dirty="0" err="1" smtClean="0"/>
+              <a:t>Cheatsheet</a:t>
+            </a:r>
+            <a:r>
+              <a:rPr lang="en-US" sz="1200" i="1" dirty="0"/>
+              <a:t>: </a:t>
+            </a:r>
+            <a:r>
+              <a:rPr lang="en-US" sz="1200" dirty="0" smtClean="0"/>
+              <a:t/>
+            </a:r>
+            <a:br>
+              <a:rPr lang="en-US" sz="1200" dirty="0" smtClean="0"/>
+            </a:br>
+            <a:r>
+              <a:rPr lang="en-US" sz="1200" dirty="0" smtClean="0">
+                <a:hlinkClick r:id="rId2"/>
+              </a:rPr>
+              <a:t>http</a:t>
+            </a:r>
+            <a:r>
+              <a:rPr lang="en-US" sz="1200" dirty="0">
+                <a:hlinkClick r:id="rId2"/>
+              </a:rPr>
+              <a:t>://</a:t>
+            </a:r>
+            <a:r>
+              <a:rPr lang="en-US" sz="1200" dirty="0" err="1">
+                <a:hlinkClick r:id="rId2"/>
+              </a:rPr>
+              <a:t>docs.couchbase.com</a:t>
+            </a:r>
+            <a:r>
+              <a:rPr lang="en-US" sz="1200" dirty="0">
+                <a:hlinkClick r:id="rId2"/>
+              </a:rPr>
+              <a:t>/files/Couchbase-N1QL-CheatSheet.pdf</a:t>
+            </a:r>
+            <a:endParaRPr lang="en-US" sz="1200" dirty="0"/>
+          </a:p>
+        </p:txBody>
+      </p:sp>
+    </p:spTree>
+    <p:extLst>
+      <p:ext uri="{BB962C8B-B14F-4D97-AF65-F5344CB8AC3E}">
+        <p14:creationId xmlns:p14="http://schemas.microsoft.com/office/powerpoint/2010/main" val="2629752433"/>
+      </p:ext>
+    </p:extLst>
+  </p:cSld>
+  <p:clrMapOvr>
+    <a:masterClrMapping/>
+  </p:clrMapOvr>
+  <p:timing>
+    <p:tnLst>
+      <p:par>
+        <p:cTn xmlns:p14="http://schemas.microsoft.com/office/powerpoint/2010/main" id="1" dur="indefinite" restart="never" nodeType="tmRoot"/>
+      </p:par>
+    </p:tnLst>
+  </p:timing>
+</p:sld>
+</file>
+
+<file path=ppt/slides/slide17.xml><?xml version="1.0" encoding="utf-8"?>
+<p:sld xmlns:a="http://schemas.openxmlformats.org/drawingml/2006/main" xmlns:r="http://schemas.openxmlformats.org/officeDocument/2006/relationships" xmlns:p="http://schemas.openxmlformats.org/presentationml/2006/main">
+  <p:cSld>
+    <p:spTree>
+      <p:nvGrpSpPr>
+        <p:cNvPr id="1" name=""/>
+        <p:cNvGrpSpPr/>
+        <p:nvPr/>
+      </p:nvGrpSpPr>
+      <p:grpSpPr>
+        <a:xfrm>
+          <a:off x="0" y="0"/>
+          <a:ext cx="0" cy="0"/>
+          <a:chOff x="0" y="0"/>
+          <a:chExt cx="0" cy="0"/>
+        </a:xfrm>
+      </p:grpSpPr>
+      <p:sp>
+        <p:nvSpPr>
+          <p:cNvPr id="2" name="Title 1"/>
+          <p:cNvSpPr>
+            <a:spLocks noGrp="1"/>
+          </p:cNvSpPr>
+          <p:nvPr>
             <p:ph type="ctrTitle"/>
           </p:nvPr>
         </p:nvSpPr>
@@ -4821,7 +5456,7 @@
 </p:sld>
 </file>
 
-<file path=ppt/slides/slide17.xml><?xml version="1.0" encoding="utf-8"?>
+<file path=ppt/slides/slide18.xml><?xml version="1.0" encoding="utf-8"?>
 <p:sld xmlns:a="http://schemas.openxmlformats.org/drawingml/2006/main" xmlns:r="http://schemas.openxmlformats.org/officeDocument/2006/relationships" xmlns:p="http://schemas.openxmlformats.org/presentationml/2006/main">
   <p:cSld>
     <p:spTree>
@@ -4948,14 +5583,12 @@
               <a:rPr lang="en-US" dirty="0" smtClean="0"/>
               <a:t>Installation</a:t>
             </a:r>
-            <a:endParaRPr lang="en-US" dirty="0" smtClean="0"/>
           </a:p>
           <a:p>
             <a:r>
               <a:rPr lang="en-US" dirty="0" smtClean="0"/>
               <a:t>Verify `travel-sample` bucket is available</a:t>
             </a:r>
-            <a:endParaRPr lang="en-US" dirty="0" smtClean="0"/>
           </a:p>
           <a:p>
             <a:r>
@@ -4970,7 +5603,6 @@
               <a:rPr lang="en-US" dirty="0" smtClean="0"/>
               <a:t> lightly to explore</a:t>
             </a:r>
-            <a:endParaRPr lang="en-US" dirty="0" smtClean="0"/>
           </a:p>
           <a:p>
             <a:endParaRPr lang="en-US" dirty="0"/>
@@ -5328,6 +5960,13 @@
   <p:clrMapOvr>
     <a:masterClrMapping/>
   </p:clrMapOvr>
+  <p:timing>
+    <p:tnLst>
+      <p:par>
+        <p:cTn xmlns:p14="http://schemas.microsoft.com/office/powerpoint/2010/main" id="1" dur="indefinite" restart="never" nodeType="tmRoot"/>
+      </p:par>
+    </p:tnLst>
+  </p:timing>
 </p:sld>
 </file>
 
@@ -5531,6 +6170,13 @@
   <p:clrMapOvr>
     <a:masterClrMapping/>
   </p:clrMapOvr>
+  <p:timing>
+    <p:tnLst>
+      <p:par>
+        <p:cTn xmlns:p14="http://schemas.microsoft.com/office/powerpoint/2010/main" id="1" dur="indefinite" restart="never" nodeType="tmRoot"/>
+      </p:par>
+    </p:tnLst>
+  </p:timing>
 </p:sld>
 </file>
 
@@ -5671,6 +6317,13 @@
   <p:clrMapOvr>
     <a:masterClrMapping/>
   </p:clrMapOvr>
+  <p:timing>
+    <p:tnLst>
+      <p:par>
+        <p:cTn xmlns:p14="http://schemas.microsoft.com/office/powerpoint/2010/main" id="1" dur="indefinite" restart="never" nodeType="tmRoot"/>
+      </p:par>
+    </p:tnLst>
+  </p:timing>
 </p:sld>
 </file>
 
@@ -5708,160 +6361,230 @@
           <a:p>
             <a:r>
               <a:rPr lang="en-US" dirty="0" smtClean="0"/>
-              <a:t>Step 1</a:t>
+              <a:t>Uninstallation of 3.0</a:t>
             </a:r>
             <a:endParaRPr lang="en-US" dirty="0"/>
           </a:p>
         </p:txBody>
       </p:sp>
-      <p:pic>
-        <p:nvPicPr>
-          <p:cNvPr id="3" name="Picture 2" descr="Initial Screen.png"/>
-          <p:cNvPicPr>
-            <a:picLocks noChangeAspect="1"/>
-          </p:cNvPicPr>
-          <p:nvPr/>
-        </p:nvPicPr>
-        <p:blipFill>
-          <a:blip r:embed="rId2" cstate="print">
-            <a:extLst>
-              <a:ext uri="{28A0092B-C50C-407E-A947-70E740481C1C}">
-                <a14:useLocalDpi xmlns:a14="http://schemas.microsoft.com/office/drawing/2010/main"/>
-              </a:ext>
-            </a:extLst>
-          </a:blip>
-          <a:stretch>
-            <a:fillRect/>
-          </a:stretch>
-        </p:blipFill>
+      <p:sp>
+        <p:nvSpPr>
+          <p:cNvPr id="3" name="Content Placeholder 2"/>
+          <p:cNvSpPr>
+            <a:spLocks noGrp="1"/>
+          </p:cNvSpPr>
+          <p:nvPr>
+            <p:ph idx="1"/>
+          </p:nvPr>
+        </p:nvSpPr>
         <p:spPr>
           <a:xfrm>
-            <a:off x="388324" y="766276"/>
-            <a:ext cx="3599589" cy="2939143"/>
-          </a:xfrm>
-          <a:prstGeom prst="rect">
-            <a:avLst/>
-          </a:prstGeom>
-        </p:spPr>
-      </p:pic>
-      <p:pic>
-        <p:nvPicPr>
-          <p:cNvPr id="4" name="Picture 3" descr="1 of 5 – New Cluster and Services.png"/>
-          <p:cNvPicPr>
-            <a:picLocks noChangeAspect="1"/>
-          </p:cNvPicPr>
-          <p:nvPr/>
-        </p:nvPicPr>
-        <p:blipFill>
-          <a:blip r:embed="rId3" cstate="print">
-            <a:extLst>
-              <a:ext uri="{28A0092B-C50C-407E-A947-70E740481C1C}">
-                <a14:useLocalDpi xmlns:a14="http://schemas.microsoft.com/office/drawing/2010/main"/>
-              </a:ext>
-            </a:extLst>
-          </a:blip>
-          <a:stretch>
-            <a:fillRect/>
-          </a:stretch>
-        </p:blipFill>
-        <p:spPr>
-          <a:xfrm>
-            <a:off x="4544449" y="766276"/>
-            <a:ext cx="3843606" cy="3275045"/>
-          </a:xfrm>
-          <a:prstGeom prst="rect">
-            <a:avLst/>
-          </a:prstGeom>
-        </p:spPr>
-      </p:pic>
-      <p:sp>
-        <p:nvSpPr>
-          <p:cNvPr id="5" name="TextBox 4"/>
-          <p:cNvSpPr txBox="1"/>
-          <p:nvPr/>
-        </p:nvSpPr>
-        <p:spPr>
-          <a:xfrm>
-            <a:off x="619221" y="3831383"/>
-            <a:ext cx="3138084" cy="369332"/>
-          </a:xfrm>
-          <a:prstGeom prst="rect">
-            <a:avLst/>
-          </a:prstGeom>
-          <a:noFill/>
-        </p:spPr>
-        <p:txBody>
-          <a:bodyPr wrap="square" rtlCol="0">
-            <a:spAutoFit/>
-          </a:bodyPr>
+            <a:off x="457200" y="685799"/>
+            <a:ext cx="8007739" cy="3911859"/>
+          </a:xfrm>
+        </p:spPr>
+        <p:txBody>
+          <a:bodyPr/>
           <a:lstStyle/>
           <a:p>
             <a:r>
               <a:rPr lang="en-US" dirty="0" smtClean="0"/>
-              <a:t>Click “Setup”</a:t>
-            </a:r>
-            <a:endParaRPr lang="en-US" dirty="0"/>
-          </a:p>
-        </p:txBody>
-      </p:sp>
-      <p:sp>
-        <p:nvSpPr>
-          <p:cNvPr id="6" name="TextBox 5"/>
-          <p:cNvSpPr txBox="1"/>
-          <p:nvPr/>
-        </p:nvSpPr>
-        <p:spPr>
-          <a:xfrm>
-            <a:off x="4544449" y="4041321"/>
-            <a:ext cx="3138084" cy="646331"/>
-          </a:xfrm>
-          <a:prstGeom prst="rect">
-            <a:avLst/>
-          </a:prstGeom>
-          <a:noFill/>
-        </p:spPr>
-        <p:txBody>
-          <a:bodyPr wrap="square" rtlCol="0">
-            <a:spAutoFit/>
-          </a:bodyPr>
-          <a:lstStyle/>
-          <a:p>
-            <a:r>
-              <a:rPr lang="en-US" b="1" dirty="0" smtClean="0"/>
-              <a:t>Important</a:t>
-            </a:r>
-            <a:r>
-              <a:rPr lang="en-US" i="1" dirty="0" smtClean="0"/>
-              <a:t>:</a:t>
-            </a:r>
-            <a:r>
+              <a:t>Mac OS X: </a:t>
+            </a:r>
+            <a:br>
               <a:rPr lang="en-US" dirty="0" smtClean="0"/>
-              <a:t> Check the box next to </a:t>
-            </a:r>
-            <a:r>
-              <a:rPr lang="en-US" i="1" dirty="0" smtClean="0"/>
-              <a:t>Index</a:t>
-            </a:r>
-            <a:r>
-              <a:rPr lang="en-US" dirty="0" smtClean="0"/>
-              <a:t> and </a:t>
-            </a:r>
-            <a:r>
-              <a:rPr lang="en-US" i="1" dirty="0" smtClean="0"/>
-              <a:t>Query</a:t>
-            </a:r>
-            <a:r>
-              <a:rPr lang="en-US" dirty="0" smtClean="0"/>
-              <a:t> Services.</a:t>
-            </a:r>
-            <a:endParaRPr lang="en-US" i="1" dirty="0"/>
+            </a:br>
+            <a:r>
+              <a:rPr lang="en-US" sz="2000" dirty="0" smtClean="0"/>
+              <a:t>Remove or rename the </a:t>
+            </a:r>
+            <a:r>
+              <a:rPr lang="en-US" sz="2000" dirty="0" smtClean="0">
+                <a:latin typeface="Consolas"/>
+                <a:cs typeface="Consolas"/>
+              </a:rPr>
+              <a:t>Couchbase</a:t>
+            </a:r>
+            <a:r>
+              <a:rPr lang="en-US" sz="2000" dirty="0" smtClean="0"/>
+              <a:t> directory in </a:t>
+            </a:r>
+            <a:br>
+              <a:rPr lang="en-US" sz="2000" dirty="0" smtClean="0"/>
+            </a:br>
+            <a:r>
+              <a:rPr lang="en-US" sz="2000" dirty="0" smtClean="0">
+                <a:latin typeface="Consolas"/>
+                <a:cs typeface="Consolas"/>
+              </a:rPr>
+              <a:t>~/Library/Application Support</a:t>
+            </a:r>
+          </a:p>
+          <a:p>
+            <a:r>
+              <a:rPr lang="en-US" dirty="0" smtClean="0">
+                <a:latin typeface="+mj-lt"/>
+                <a:cs typeface="Consolas"/>
+              </a:rPr>
+              <a:t>Linux: </a:t>
+            </a:r>
+            <a:br>
+              <a:rPr lang="en-US" dirty="0" smtClean="0">
+                <a:latin typeface="+mj-lt"/>
+                <a:cs typeface="Consolas"/>
+              </a:rPr>
+            </a:br>
+            <a:r>
+              <a:rPr lang="en-US" sz="2000" dirty="0" smtClean="0">
+                <a:latin typeface="+mj-lt"/>
+                <a:cs typeface="Consolas"/>
+              </a:rPr>
+              <a:t>Uninstall using your package manager (</a:t>
+            </a:r>
+            <a:r>
+              <a:rPr lang="en-US" sz="2000" dirty="0" smtClean="0">
+                <a:latin typeface="Consolas"/>
+                <a:cs typeface="Consolas"/>
+              </a:rPr>
+              <a:t>rpm -e </a:t>
+            </a:r>
+            <a:r>
+              <a:rPr lang="en-US" sz="2000" dirty="0" err="1" smtClean="0">
+                <a:latin typeface="Consolas"/>
+                <a:cs typeface="Consolas"/>
+              </a:rPr>
+              <a:t>couchbase</a:t>
+            </a:r>
+            <a:r>
+              <a:rPr lang="en-US" sz="2000" dirty="0" smtClean="0">
+                <a:latin typeface="Consolas"/>
+                <a:cs typeface="Consolas"/>
+              </a:rPr>
+              <a:t>-server </a:t>
+            </a:r>
+            <a:r>
+              <a:rPr lang="en-US" sz="2000" dirty="0" smtClean="0">
+                <a:latin typeface="+mj-lt"/>
+                <a:cs typeface="Consolas"/>
+              </a:rPr>
+              <a:t>or </a:t>
+            </a:r>
+            <a:r>
+              <a:rPr lang="en-US" sz="2000" dirty="0" err="1" smtClean="0">
+                <a:latin typeface="Consolas"/>
+                <a:cs typeface="Consolas"/>
+              </a:rPr>
+              <a:t>dpkg</a:t>
+            </a:r>
+            <a:r>
+              <a:rPr lang="en-US" sz="2000" dirty="0" smtClean="0">
+                <a:latin typeface="Consolas"/>
+                <a:cs typeface="Consolas"/>
+              </a:rPr>
+              <a:t> -</a:t>
+            </a:r>
+            <a:r>
+              <a:rPr lang="en-US" sz="2000" dirty="0">
+                <a:latin typeface="Consolas"/>
+                <a:cs typeface="Consolas"/>
+              </a:rPr>
+              <a:t>r</a:t>
+            </a:r>
+            <a:r>
+              <a:rPr lang="en-US" sz="2000" dirty="0" smtClean="0">
+                <a:latin typeface="Consolas"/>
+                <a:cs typeface="Consolas"/>
+              </a:rPr>
+              <a:t> </a:t>
+            </a:r>
+            <a:r>
+              <a:rPr lang="en-US" sz="2000" dirty="0" err="1" smtClean="0">
+                <a:latin typeface="Consolas"/>
+                <a:cs typeface="Consolas"/>
+              </a:rPr>
+              <a:t>couchbase</a:t>
+            </a:r>
+            <a:r>
+              <a:rPr lang="en-US" sz="2000" dirty="0" smtClean="0">
+                <a:latin typeface="Consolas"/>
+                <a:cs typeface="Consolas"/>
+              </a:rPr>
+              <a:t>-server</a:t>
+            </a:r>
+            <a:r>
+              <a:rPr lang="en-US" sz="2000" dirty="0" smtClean="0">
+                <a:latin typeface="+mj-lt"/>
+                <a:cs typeface="Consolas"/>
+              </a:rPr>
+              <a:t>) </a:t>
+            </a:r>
+            <a:br>
+              <a:rPr lang="en-US" sz="2000" dirty="0" smtClean="0">
+                <a:latin typeface="+mj-lt"/>
+                <a:cs typeface="Consolas"/>
+              </a:rPr>
+            </a:br>
+            <a:r>
+              <a:rPr lang="en-US" sz="2000" dirty="0" smtClean="0">
+                <a:latin typeface="+mj-lt"/>
+                <a:cs typeface="Consolas"/>
+              </a:rPr>
+              <a:t>Remove or rename the </a:t>
+            </a:r>
+            <a:r>
+              <a:rPr lang="en-US" sz="2000" dirty="0" err="1" smtClean="0">
+                <a:latin typeface="Consolas"/>
+                <a:cs typeface="Consolas"/>
+              </a:rPr>
+              <a:t>couchbase</a:t>
+            </a:r>
+            <a:r>
+              <a:rPr lang="en-US" sz="2000" dirty="0" smtClean="0">
+                <a:latin typeface="+mj-lt"/>
+                <a:cs typeface="Consolas"/>
+              </a:rPr>
+              <a:t> directory in </a:t>
+            </a:r>
+            <a:r>
+              <a:rPr lang="en-US" sz="2000" dirty="0" smtClean="0">
+                <a:latin typeface="Consolas"/>
+                <a:cs typeface="Consolas"/>
+              </a:rPr>
+              <a:t>/opt</a:t>
+            </a:r>
+          </a:p>
+          <a:p>
+            <a:r>
+              <a:rPr lang="en-US" dirty="0" smtClean="0">
+                <a:latin typeface="+mj-lt"/>
+                <a:cs typeface="Consolas"/>
+              </a:rPr>
+              <a:t>Windows:</a:t>
+            </a:r>
+            <a:br>
+              <a:rPr lang="en-US" dirty="0" smtClean="0">
+                <a:latin typeface="+mj-lt"/>
+                <a:cs typeface="Consolas"/>
+              </a:rPr>
+            </a:br>
+            <a:r>
+              <a:rPr lang="en-US" sz="2000" dirty="0" smtClean="0">
+                <a:latin typeface="+mj-lt"/>
+                <a:cs typeface="Consolas"/>
+              </a:rPr>
+              <a:t>Run the uninstaller; if it fails, then run the installer for 4.0 beta</a:t>
+            </a:r>
+            <a:endParaRPr lang="en-US" sz="2000" dirty="0">
+              <a:latin typeface="+mj-lt"/>
+              <a:cs typeface="Consolas"/>
+            </a:endParaRPr>
           </a:p>
         </p:txBody>
       </p:sp>
     </p:spTree>
     <p:extLst>
       <p:ext uri="{BB962C8B-B14F-4D97-AF65-F5344CB8AC3E}">
-        <p14:creationId xmlns:p14="http://schemas.microsoft.com/office/powerpoint/2010/main" val="1629592378"/>
+        <p14:creationId xmlns:p14="http://schemas.microsoft.com/office/powerpoint/2010/main" val="258808531"/>
       </p:ext>
     </p:extLst>
   </p:cSld>
@@ -5905,6 +6628,300 @@
           <a:p>
             <a:r>
               <a:rPr lang="en-US" dirty="0" smtClean="0"/>
+              <a:t>Step 1</a:t>
+            </a:r>
+            <a:endParaRPr lang="en-US" dirty="0"/>
+          </a:p>
+        </p:txBody>
+      </p:sp>
+      <p:pic>
+        <p:nvPicPr>
+          <p:cNvPr id="3" name="Picture 2" descr="Initial Screen.png"/>
+          <p:cNvPicPr>
+            <a:picLocks noChangeAspect="1"/>
+          </p:cNvPicPr>
+          <p:nvPr/>
+        </p:nvPicPr>
+        <p:blipFill>
+          <a:blip r:embed="rId2" cstate="print">
+            <a:extLst>
+              <a:ext uri="{28A0092B-C50C-407E-A947-70E740481C1C}">
+                <a14:useLocalDpi xmlns:a14="http://schemas.microsoft.com/office/drawing/2010/main"/>
+              </a:ext>
+            </a:extLst>
+          </a:blip>
+          <a:stretch>
+            <a:fillRect/>
+          </a:stretch>
+        </p:blipFill>
+        <p:spPr>
+          <a:xfrm>
+            <a:off x="388324" y="766276"/>
+            <a:ext cx="3599589" cy="2939143"/>
+          </a:xfrm>
+          <a:prstGeom prst="rect">
+            <a:avLst/>
+          </a:prstGeom>
+        </p:spPr>
+      </p:pic>
+      <p:pic>
+        <p:nvPicPr>
+          <p:cNvPr id="4" name="Picture 3" descr="1 of 5 – New Cluster and Services.png"/>
+          <p:cNvPicPr>
+            <a:picLocks noChangeAspect="1"/>
+          </p:cNvPicPr>
+          <p:nvPr/>
+        </p:nvPicPr>
+        <p:blipFill>
+          <a:blip r:embed="rId3" cstate="print">
+            <a:extLst>
+              <a:ext uri="{28A0092B-C50C-407E-A947-70E740481C1C}">
+                <a14:useLocalDpi xmlns:a14="http://schemas.microsoft.com/office/drawing/2010/main"/>
+              </a:ext>
+            </a:extLst>
+          </a:blip>
+          <a:stretch>
+            <a:fillRect/>
+          </a:stretch>
+        </p:blipFill>
+        <p:spPr>
+          <a:xfrm>
+            <a:off x="4544449" y="766276"/>
+            <a:ext cx="3843606" cy="3275045"/>
+          </a:xfrm>
+          <a:prstGeom prst="rect">
+            <a:avLst/>
+          </a:prstGeom>
+        </p:spPr>
+      </p:pic>
+      <p:sp>
+        <p:nvSpPr>
+          <p:cNvPr id="5" name="TextBox 4"/>
+          <p:cNvSpPr txBox="1"/>
+          <p:nvPr/>
+        </p:nvSpPr>
+        <p:spPr>
+          <a:xfrm>
+            <a:off x="619221" y="3831383"/>
+            <a:ext cx="3138084" cy="369332"/>
+          </a:xfrm>
+          <a:prstGeom prst="rect">
+            <a:avLst/>
+          </a:prstGeom>
+          <a:noFill/>
+        </p:spPr>
+        <p:txBody>
+          <a:bodyPr wrap="square" rtlCol="0">
+            <a:spAutoFit/>
+          </a:bodyPr>
+          <a:lstStyle/>
+          <a:p>
+            <a:r>
+              <a:rPr lang="en-US" dirty="0" smtClean="0"/>
+              <a:t>Click “Setup”</a:t>
+            </a:r>
+            <a:endParaRPr lang="en-US" dirty="0"/>
+          </a:p>
+        </p:txBody>
+      </p:sp>
+      <p:sp>
+        <p:nvSpPr>
+          <p:cNvPr id="6" name="TextBox 5"/>
+          <p:cNvSpPr txBox="1"/>
+          <p:nvPr/>
+        </p:nvSpPr>
+        <p:spPr>
+          <a:xfrm>
+            <a:off x="4544449" y="4041321"/>
+            <a:ext cx="3138084" cy="646331"/>
+          </a:xfrm>
+          <a:prstGeom prst="rect">
+            <a:avLst/>
+          </a:prstGeom>
+          <a:noFill/>
+        </p:spPr>
+        <p:txBody>
+          <a:bodyPr wrap="square" rtlCol="0">
+            <a:spAutoFit/>
+          </a:bodyPr>
+          <a:lstStyle/>
+          <a:p>
+            <a:r>
+              <a:rPr lang="en-US" b="1" dirty="0" smtClean="0"/>
+              <a:t>Important</a:t>
+            </a:r>
+            <a:r>
+              <a:rPr lang="en-US" i="1" dirty="0" smtClean="0"/>
+              <a:t>:</a:t>
+            </a:r>
+            <a:r>
+              <a:rPr lang="en-US" dirty="0" smtClean="0"/>
+              <a:t> Check the box next to </a:t>
+            </a:r>
+            <a:r>
+              <a:rPr lang="en-US" i="1" dirty="0" smtClean="0"/>
+              <a:t>Index</a:t>
+            </a:r>
+            <a:r>
+              <a:rPr lang="en-US" dirty="0" smtClean="0"/>
+              <a:t> and </a:t>
+            </a:r>
+            <a:r>
+              <a:rPr lang="en-US" i="1" dirty="0" smtClean="0"/>
+              <a:t>Query</a:t>
+            </a:r>
+            <a:r>
+              <a:rPr lang="en-US" dirty="0" smtClean="0"/>
+              <a:t> Services.</a:t>
+            </a:r>
+            <a:endParaRPr lang="en-US" i="1" dirty="0"/>
+          </a:p>
+        </p:txBody>
+      </p:sp>
+      <p:sp>
+        <p:nvSpPr>
+          <p:cNvPr id="7" name="Rectangle 6"/>
+          <p:cNvSpPr/>
+          <p:nvPr/>
+        </p:nvSpPr>
+        <p:spPr>
+          <a:xfrm>
+            <a:off x="5870160" y="3079850"/>
+            <a:ext cx="1100031" cy="124994"/>
+          </a:xfrm>
+          <a:prstGeom prst="rect">
+            <a:avLst/>
+          </a:prstGeom>
+          <a:noFill/>
+          <a:ln>
+            <a:solidFill>
+              <a:schemeClr val="accent2"/>
+            </a:solidFill>
+          </a:ln>
+          <a:effectLst/>
+        </p:spPr>
+        <p:style>
+          <a:lnRef idx="1">
+            <a:schemeClr val="accent1"/>
+          </a:lnRef>
+          <a:fillRef idx="3">
+            <a:schemeClr val="accent1"/>
+          </a:fillRef>
+          <a:effectRef idx="2">
+            <a:schemeClr val="accent1"/>
+          </a:effectRef>
+          <a:fontRef idx="minor">
+            <a:schemeClr val="lt1"/>
+          </a:fontRef>
+        </p:style>
+        <p:txBody>
+          <a:bodyPr rtlCol="0" anchor="ctr"/>
+          <a:lstStyle/>
+          <a:p>
+            <a:pPr algn="ctr"/>
+            <a:endParaRPr lang="en-US"/>
+          </a:p>
+        </p:txBody>
+      </p:sp>
+      <p:sp>
+        <p:nvSpPr>
+          <p:cNvPr id="8" name="Left Arrow 7"/>
+          <p:cNvSpPr/>
+          <p:nvPr/>
+        </p:nvSpPr>
+        <p:spPr>
+          <a:xfrm rot="19263866">
+            <a:off x="6970191" y="2869861"/>
+            <a:ext cx="300008" cy="119994"/>
+          </a:xfrm>
+          <a:prstGeom prst="leftArrow">
+            <a:avLst/>
+          </a:prstGeom>
+          <a:solidFill>
+            <a:schemeClr val="accent2"/>
+          </a:solidFill>
+          <a:ln>
+            <a:noFill/>
+          </a:ln>
+          <a:effectLst/>
+        </p:spPr>
+        <p:style>
+          <a:lnRef idx="1">
+            <a:schemeClr val="accent1"/>
+          </a:lnRef>
+          <a:fillRef idx="3">
+            <a:schemeClr val="accent1"/>
+          </a:fillRef>
+          <a:effectRef idx="2">
+            <a:schemeClr val="accent1"/>
+          </a:effectRef>
+          <a:fontRef idx="minor">
+            <a:schemeClr val="lt1"/>
+          </a:fontRef>
+        </p:style>
+        <p:txBody>
+          <a:bodyPr rtlCol="0" anchor="ctr"/>
+          <a:lstStyle/>
+          <a:p>
+            <a:pPr algn="ctr"/>
+            <a:endParaRPr lang="en-US"/>
+          </a:p>
+        </p:txBody>
+      </p:sp>
+    </p:spTree>
+    <p:extLst>
+      <p:ext uri="{BB962C8B-B14F-4D97-AF65-F5344CB8AC3E}">
+        <p14:creationId xmlns:p14="http://schemas.microsoft.com/office/powerpoint/2010/main" val="1629592378"/>
+      </p:ext>
+    </p:extLst>
+  </p:cSld>
+  <p:clrMapOvr>
+    <a:masterClrMapping/>
+  </p:clrMapOvr>
+  <p:timing>
+    <p:tnLst>
+      <p:par>
+        <p:cTn xmlns:p14="http://schemas.microsoft.com/office/powerpoint/2010/main" id="1" dur="indefinite" restart="never" nodeType="tmRoot"/>
+      </p:par>
+    </p:tnLst>
+  </p:timing>
+</p:sld>
+</file>
+
+<file path=ppt/slides/slide9.xml><?xml version="1.0" encoding="utf-8"?>
+<p:sld xmlns:a="http://schemas.openxmlformats.org/drawingml/2006/main" xmlns:r="http://schemas.openxmlformats.org/officeDocument/2006/relationships" xmlns:p="http://schemas.openxmlformats.org/presentationml/2006/main">
+  <p:cSld>
+    <p:spTree>
+      <p:nvGrpSpPr>
+        <p:cNvPr id="1" name=""/>
+        <p:cNvGrpSpPr/>
+        <p:nvPr/>
+      </p:nvGrpSpPr>
+      <p:grpSpPr>
+        <a:xfrm>
+          <a:off x="0" y="0"/>
+          <a:ext cx="0" cy="0"/>
+          <a:chOff x="0" y="0"/>
+          <a:chExt cx="0" cy="0"/>
+        </a:xfrm>
+      </p:grpSpPr>
+      <p:sp>
+        <p:nvSpPr>
+          <p:cNvPr id="2" name="Title 1"/>
+          <p:cNvSpPr>
+            <a:spLocks noGrp="1"/>
+          </p:cNvSpPr>
+          <p:nvPr>
+            <p:ph type="title"/>
+          </p:nvPr>
+        </p:nvSpPr>
+        <p:spPr/>
+        <p:txBody>
+          <a:bodyPr/>
+          <a:lstStyle/>
+          <a:p>
+            <a:r>
+              <a:rPr lang="en-US" dirty="0" smtClean="0"/>
               <a:t>Steps 2 &amp; 3</a:t>
             </a:r>
             <a:endParaRPr lang="en-US" dirty="0"/>
@@ -6055,6 +7072,276 @@
           </a:p>
         </p:txBody>
       </p:sp>
+      <p:sp>
+        <p:nvSpPr>
+          <p:cNvPr id="7" name="Rectangle 6"/>
+          <p:cNvSpPr/>
+          <p:nvPr/>
+        </p:nvSpPr>
+        <p:spPr>
+          <a:xfrm>
+            <a:off x="5870160" y="2354884"/>
+            <a:ext cx="375011" cy="124994"/>
+          </a:xfrm>
+          <a:prstGeom prst="rect">
+            <a:avLst/>
+          </a:prstGeom>
+          <a:noFill/>
+          <a:ln>
+            <a:solidFill>
+              <a:schemeClr val="accent2"/>
+            </a:solidFill>
+          </a:ln>
+          <a:effectLst/>
+        </p:spPr>
+        <p:style>
+          <a:lnRef idx="1">
+            <a:schemeClr val="accent1"/>
+          </a:lnRef>
+          <a:fillRef idx="3">
+            <a:schemeClr val="accent1"/>
+          </a:fillRef>
+          <a:effectRef idx="2">
+            <a:schemeClr val="accent1"/>
+          </a:effectRef>
+          <a:fontRef idx="minor">
+            <a:schemeClr val="lt1"/>
+          </a:fontRef>
+        </p:style>
+        <p:txBody>
+          <a:bodyPr rtlCol="0" anchor="ctr"/>
+          <a:lstStyle/>
+          <a:p>
+            <a:pPr algn="ctr"/>
+            <a:endParaRPr lang="en-US"/>
+          </a:p>
+        </p:txBody>
+      </p:sp>
+      <p:sp>
+        <p:nvSpPr>
+          <p:cNvPr id="8" name="Left Arrow 7"/>
+          <p:cNvSpPr/>
+          <p:nvPr/>
+        </p:nvSpPr>
+        <p:spPr>
+          <a:xfrm rot="19263866">
+            <a:off x="6249553" y="2144894"/>
+            <a:ext cx="300008" cy="119994"/>
+          </a:xfrm>
+          <a:prstGeom prst="leftArrow">
+            <a:avLst/>
+          </a:prstGeom>
+          <a:solidFill>
+            <a:schemeClr val="accent2"/>
+          </a:solidFill>
+          <a:ln>
+            <a:noFill/>
+          </a:ln>
+          <a:effectLst/>
+        </p:spPr>
+        <p:style>
+          <a:lnRef idx="1">
+            <a:schemeClr val="accent1"/>
+          </a:lnRef>
+          <a:fillRef idx="3">
+            <a:schemeClr val="accent1"/>
+          </a:fillRef>
+          <a:effectRef idx="2">
+            <a:schemeClr val="accent1"/>
+          </a:effectRef>
+          <a:fontRef idx="minor">
+            <a:schemeClr val="lt1"/>
+          </a:fontRef>
+        </p:style>
+        <p:txBody>
+          <a:bodyPr rtlCol="0" anchor="ctr"/>
+          <a:lstStyle/>
+          <a:p>
+            <a:pPr algn="ctr"/>
+            <a:endParaRPr lang="en-US"/>
+          </a:p>
+        </p:txBody>
+      </p:sp>
+      <p:sp>
+        <p:nvSpPr>
+          <p:cNvPr id="9" name="Rectangle 8"/>
+          <p:cNvSpPr/>
+          <p:nvPr/>
+        </p:nvSpPr>
+        <p:spPr>
+          <a:xfrm>
+            <a:off x="1135031" y="2141450"/>
+            <a:ext cx="480013" cy="124994"/>
+          </a:xfrm>
+          <a:prstGeom prst="rect">
+            <a:avLst/>
+          </a:prstGeom>
+          <a:noFill/>
+          <a:ln>
+            <a:solidFill>
+              <a:schemeClr val="accent2"/>
+            </a:solidFill>
+          </a:ln>
+          <a:effectLst/>
+        </p:spPr>
+        <p:style>
+          <a:lnRef idx="1">
+            <a:schemeClr val="accent1"/>
+          </a:lnRef>
+          <a:fillRef idx="3">
+            <a:schemeClr val="accent1"/>
+          </a:fillRef>
+          <a:effectRef idx="2">
+            <a:schemeClr val="accent1"/>
+          </a:effectRef>
+          <a:fontRef idx="minor">
+            <a:schemeClr val="lt1"/>
+          </a:fontRef>
+        </p:style>
+        <p:txBody>
+          <a:bodyPr rtlCol="0" anchor="ctr"/>
+          <a:lstStyle/>
+          <a:p>
+            <a:pPr algn="ctr"/>
+            <a:endParaRPr lang="en-US"/>
+          </a:p>
+        </p:txBody>
+      </p:sp>
+      <p:sp>
+        <p:nvSpPr>
+          <p:cNvPr id="10" name="Left Arrow 9"/>
+          <p:cNvSpPr/>
+          <p:nvPr/>
+        </p:nvSpPr>
+        <p:spPr>
+          <a:xfrm rot="19263866">
+            <a:off x="1615044" y="1931461"/>
+            <a:ext cx="300008" cy="119994"/>
+          </a:xfrm>
+          <a:prstGeom prst="leftArrow">
+            <a:avLst/>
+          </a:prstGeom>
+          <a:solidFill>
+            <a:schemeClr val="accent2"/>
+          </a:solidFill>
+          <a:ln>
+            <a:noFill/>
+          </a:ln>
+          <a:effectLst/>
+        </p:spPr>
+        <p:style>
+          <a:lnRef idx="1">
+            <a:schemeClr val="accent1"/>
+          </a:lnRef>
+          <a:fillRef idx="3">
+            <a:schemeClr val="accent1"/>
+          </a:fillRef>
+          <a:effectRef idx="2">
+            <a:schemeClr val="accent1"/>
+          </a:effectRef>
+          <a:fontRef idx="minor">
+            <a:schemeClr val="lt1"/>
+          </a:fontRef>
+        </p:style>
+        <p:txBody>
+          <a:bodyPr rtlCol="0" anchor="ctr"/>
+          <a:lstStyle/>
+          <a:p>
+            <a:pPr algn="ctr"/>
+            <a:endParaRPr lang="en-US"/>
+          </a:p>
+        </p:txBody>
+      </p:sp>
+      <p:sp>
+        <p:nvSpPr>
+          <p:cNvPr id="11" name="Rectangle 10"/>
+          <p:cNvSpPr/>
+          <p:nvPr/>
+        </p:nvSpPr>
+        <p:spPr>
+          <a:xfrm>
+            <a:off x="1144413" y="2328936"/>
+            <a:ext cx="480013" cy="124994"/>
+          </a:xfrm>
+          <a:prstGeom prst="rect">
+            <a:avLst/>
+          </a:prstGeom>
+          <a:noFill/>
+          <a:ln>
+            <a:solidFill>
+              <a:schemeClr val="accent2"/>
+            </a:solidFill>
+          </a:ln>
+          <a:effectLst/>
+        </p:spPr>
+        <p:style>
+          <a:lnRef idx="1">
+            <a:schemeClr val="accent1"/>
+          </a:lnRef>
+          <a:fillRef idx="3">
+            <a:schemeClr val="accent1"/>
+          </a:fillRef>
+          <a:effectRef idx="2">
+            <a:schemeClr val="accent1"/>
+          </a:effectRef>
+          <a:fontRef idx="minor">
+            <a:schemeClr val="lt1"/>
+          </a:fontRef>
+        </p:style>
+        <p:txBody>
+          <a:bodyPr rtlCol="0" anchor="ctr"/>
+          <a:lstStyle/>
+          <a:p>
+            <a:pPr algn="ctr"/>
+            <a:endParaRPr lang="en-US"/>
+          </a:p>
+        </p:txBody>
+      </p:sp>
+      <p:sp>
+        <p:nvSpPr>
+          <p:cNvPr id="12" name="Left Arrow 11"/>
+          <p:cNvSpPr/>
+          <p:nvPr/>
+        </p:nvSpPr>
+        <p:spPr>
+          <a:xfrm rot="19263866">
+            <a:off x="1624426" y="2158947"/>
+            <a:ext cx="300008" cy="119994"/>
+          </a:xfrm>
+          <a:prstGeom prst="leftArrow">
+            <a:avLst/>
+          </a:prstGeom>
+          <a:solidFill>
+            <a:schemeClr val="accent2"/>
+          </a:solidFill>
+          <a:ln>
+            <a:noFill/>
+          </a:ln>
+          <a:effectLst/>
+        </p:spPr>
+        <p:style>
+          <a:lnRef idx="1">
+            <a:schemeClr val="accent1"/>
+          </a:lnRef>
+          <a:fillRef idx="3">
+            <a:schemeClr val="accent1"/>
+          </a:fillRef>
+          <a:effectRef idx="2">
+            <a:schemeClr val="accent1"/>
+          </a:effectRef>
+          <a:fontRef idx="minor">
+            <a:schemeClr val="lt1"/>
+          </a:fontRef>
+        </p:style>
+        <p:txBody>
+          <a:bodyPr rtlCol="0" anchor="ctr"/>
+          <a:lstStyle/>
+          <a:p>
+            <a:pPr algn="ctr"/>
+            <a:endParaRPr lang="en-US"/>
+          </a:p>
+        </p:txBody>
+      </p:sp>
     </p:spTree>
     <p:extLst>
       <p:ext uri="{BB962C8B-B14F-4D97-AF65-F5344CB8AC3E}">
@@ -6065,183 +7352,13 @@
   <p:clrMapOvr>
     <a:masterClrMapping/>
   </p:clrMapOvr>
-</p:sld>
-</file>
-
-<file path=ppt/slides/slide9.xml><?xml version="1.0" encoding="utf-8"?>
-<p:sld xmlns:a="http://schemas.openxmlformats.org/drawingml/2006/main" xmlns:r="http://schemas.openxmlformats.org/officeDocument/2006/relationships" xmlns:p="http://schemas.openxmlformats.org/presentationml/2006/main">
-  <p:cSld>
-    <p:spTree>
-      <p:nvGrpSpPr>
-        <p:cNvPr id="1" name=""/>
-        <p:cNvGrpSpPr/>
-        <p:nvPr/>
-      </p:nvGrpSpPr>
-      <p:grpSpPr>
-        <a:xfrm>
-          <a:off x="0" y="0"/>
-          <a:ext cx="0" cy="0"/>
-          <a:chOff x="0" y="0"/>
-          <a:chExt cx="0" cy="0"/>
-        </a:xfrm>
-      </p:grpSpPr>
-      <p:sp>
-        <p:nvSpPr>
-          <p:cNvPr id="2" name="Title 1"/>
-          <p:cNvSpPr>
-            <a:spLocks noGrp="1"/>
-          </p:cNvSpPr>
-          <p:nvPr>
-            <p:ph type="title"/>
-          </p:nvPr>
-        </p:nvSpPr>
-        <p:spPr/>
-        <p:txBody>
-          <a:bodyPr/>
-          <a:lstStyle/>
-          <a:p>
-            <a:r>
-              <a:rPr lang="en-US" dirty="0" smtClean="0"/>
-              <a:t>Steps 4 &amp; 5</a:t>
-            </a:r>
-            <a:endParaRPr lang="en-US" dirty="0"/>
-          </a:p>
-        </p:txBody>
-      </p:sp>
-      <p:pic>
-        <p:nvPicPr>
-          <p:cNvPr id="3" name="Picture 2" descr="4 of 5 – Register and agree to TnCs.png"/>
-          <p:cNvPicPr>
-            <a:picLocks noChangeAspect="1"/>
-          </p:cNvPicPr>
-          <p:nvPr/>
-        </p:nvPicPr>
-        <p:blipFill>
-          <a:blip r:embed="rId2" cstate="print">
-            <a:extLst>
-              <a:ext uri="{28A0092B-C50C-407E-A947-70E740481C1C}">
-                <a14:useLocalDpi xmlns:a14="http://schemas.microsoft.com/office/drawing/2010/main"/>
-              </a:ext>
-            </a:extLst>
-          </a:blip>
-          <a:stretch>
-            <a:fillRect/>
-          </a:stretch>
-        </p:blipFill>
-        <p:spPr>
-          <a:xfrm>
-            <a:off x="261726" y="713792"/>
-            <a:ext cx="4114800" cy="3506124"/>
-          </a:xfrm>
-          <a:prstGeom prst="rect">
-            <a:avLst/>
-          </a:prstGeom>
-        </p:spPr>
-      </p:pic>
-      <p:pic>
-        <p:nvPicPr>
-          <p:cNvPr id="4" name="Picture 3" descr="5 of 5 – Set up Administrator.png"/>
-          <p:cNvPicPr>
-            <a:picLocks noChangeAspect="1"/>
-          </p:cNvPicPr>
-          <p:nvPr/>
-        </p:nvPicPr>
-        <p:blipFill>
-          <a:blip r:embed="rId3" cstate="print">
-            <a:extLst>
-              <a:ext uri="{28A0092B-C50C-407E-A947-70E740481C1C}">
-                <a14:useLocalDpi xmlns:a14="http://schemas.microsoft.com/office/drawing/2010/main"/>
-              </a:ext>
-            </a:extLst>
-          </a:blip>
-          <a:stretch>
-            <a:fillRect/>
-          </a:stretch>
-        </p:blipFill>
-        <p:spPr>
-          <a:xfrm>
-            <a:off x="4743857" y="713793"/>
-            <a:ext cx="4114800" cy="3506123"/>
-          </a:xfrm>
-          <a:prstGeom prst="rect">
-            <a:avLst/>
-          </a:prstGeom>
-        </p:spPr>
-      </p:pic>
-      <p:sp>
-        <p:nvSpPr>
-          <p:cNvPr id="5" name="TextBox 4"/>
-          <p:cNvSpPr txBox="1"/>
-          <p:nvPr/>
-        </p:nvSpPr>
-        <p:spPr>
-          <a:xfrm>
-            <a:off x="470896" y="4041321"/>
-            <a:ext cx="3679286" cy="646331"/>
-          </a:xfrm>
-          <a:prstGeom prst="rect">
-            <a:avLst/>
-          </a:prstGeom>
-          <a:noFill/>
-        </p:spPr>
-        <p:txBody>
-          <a:bodyPr wrap="square" rtlCol="0">
-            <a:spAutoFit/>
-          </a:bodyPr>
-          <a:lstStyle/>
-          <a:p>
-            <a:r>
-              <a:rPr lang="en-US" dirty="0" smtClean="0"/>
-              <a:t>Register for update notifications and do product registration.</a:t>
-            </a:r>
-            <a:endParaRPr lang="en-US" i="1" dirty="0"/>
-          </a:p>
-        </p:txBody>
-      </p:sp>
-      <p:sp>
-        <p:nvSpPr>
-          <p:cNvPr id="6" name="TextBox 5"/>
-          <p:cNvSpPr txBox="1"/>
-          <p:nvPr/>
-        </p:nvSpPr>
-        <p:spPr>
-          <a:xfrm>
-            <a:off x="4963784" y="4041321"/>
-            <a:ext cx="3679286" cy="646331"/>
-          </a:xfrm>
-          <a:prstGeom prst="rect">
-            <a:avLst/>
-          </a:prstGeom>
-          <a:noFill/>
-        </p:spPr>
-        <p:txBody>
-          <a:bodyPr wrap="square" rtlCol="0">
-            <a:spAutoFit/>
-          </a:bodyPr>
-          <a:lstStyle/>
-          <a:p>
-            <a:r>
-              <a:rPr lang="en-US" dirty="0" smtClean="0"/>
-              <a:t>Set a password.  Any will do but </a:t>
-            </a:r>
-            <a:r>
-              <a:rPr lang="en-US" i="1" dirty="0" smtClean="0"/>
-              <a:t>be sure you remember it.</a:t>
-            </a:r>
-            <a:endParaRPr lang="en-US" i="1" dirty="0"/>
-          </a:p>
-        </p:txBody>
-      </p:sp>
-    </p:spTree>
-    <p:extLst>
-      <p:ext uri="{BB962C8B-B14F-4D97-AF65-F5344CB8AC3E}">
-        <p14:creationId xmlns:p14="http://schemas.microsoft.com/office/powerpoint/2010/main" val="2571533586"/>
-      </p:ext>
-    </p:extLst>
-  </p:cSld>
-  <p:clrMapOvr>
-    <a:masterClrMapping/>
-  </p:clrMapOvr>
+  <p:timing>
+    <p:tnLst>
+      <p:par>
+        <p:cTn xmlns:p14="http://schemas.microsoft.com/office/powerpoint/2010/main" id="1" dur="indefinite" restart="never" nodeType="tmRoot"/>
+      </p:par>
+    </p:tnLst>
+  </p:timing>
 </p:sld>
 </file>
 

</xml_diff>